<commit_message>
updated info presentation + Data.cd and GUI.cd generated
</commit_message>
<xml_diff>
--- a/DarkDungeon.WF/Presentation/TeamJohn Steinbeck.pptx
+++ b/DarkDungeon.WF/Presentation/TeamJohn Steinbeck.pptx
@@ -5,7 +5,7 @@
     <p:sldMasterId id="2147483652" r:id="rId1"/>
   </p:sldMasterIdLst>
   <p:notesMasterIdLst>
-    <p:notesMasterId r:id="rId13"/>
+    <p:notesMasterId r:id="rId14"/>
   </p:notesMasterIdLst>
   <p:sldIdLst>
     <p:sldId id="256" r:id="rId2"/>
@@ -17,8 +17,9 @@
     <p:sldId id="262" r:id="rId8"/>
     <p:sldId id="268" r:id="rId9"/>
     <p:sldId id="263" r:id="rId10"/>
-    <p:sldId id="264" r:id="rId11"/>
-    <p:sldId id="265" r:id="rId12"/>
+    <p:sldId id="269" r:id="rId11"/>
+    <p:sldId id="264" r:id="rId12"/>
+    <p:sldId id="265" r:id="rId13"/>
   </p:sldIdLst>
   <p:sldSz cx="9144000" cy="6858000" type="screen4x3"/>
   <p:notesSz cx="6881813" cy="9296400"/>
@@ -810,6 +811,101 @@
   <p:cSld>
     <p:spTree>
       <p:nvGrpSpPr>
+        <p:cNvPr id="1" name="Shape 139"/>
+        <p:cNvGrpSpPr/>
+        <p:nvPr/>
+      </p:nvGrpSpPr>
+      <p:grpSpPr>
+        <a:xfrm>
+          <a:off x="0" y="0"/>
+          <a:ext cx="0" cy="0"/>
+          <a:chOff x="0" y="0"/>
+          <a:chExt cx="0" cy="0"/>
+        </a:xfrm>
+      </p:grpSpPr>
+      <p:sp>
+        <p:nvSpPr>
+          <p:cNvPr id="140" name="Shape 140"/>
+          <p:cNvSpPr txBox="1">
+            <a:spLocks noGrp="1"/>
+          </p:cNvSpPr>
+          <p:nvPr>
+            <p:ph type="body" idx="1"/>
+          </p:nvPr>
+        </p:nvSpPr>
+        <p:spPr>
+          <a:xfrm>
+            <a:off x="687387" y="4416425"/>
+            <a:ext cx="5507037" cy="4183063"/>
+          </a:xfrm>
+          <a:prstGeom prst="rect">
+            <a:avLst/>
+          </a:prstGeom>
+        </p:spPr>
+        <p:txBody>
+          <a:bodyPr lIns="91425" tIns="91425" rIns="91425" bIns="91425" anchor="ctr" anchorCtr="0">
+            <a:noAutofit/>
+          </a:bodyPr>
+          <a:lstStyle/>
+          <a:p>
+            <a:endParaRPr/>
+          </a:p>
+        </p:txBody>
+      </p:sp>
+      <p:sp>
+        <p:nvSpPr>
+          <p:cNvPr id="141" name="Shape 141"/>
+          <p:cNvSpPr>
+            <a:spLocks noGrp="1" noRot="1" noChangeAspect="1"/>
+          </p:cNvSpPr>
+          <p:nvPr>
+            <p:ph type="sldImg" idx="2"/>
+          </p:nvPr>
+        </p:nvSpPr>
+        <p:spPr>
+          <a:xfrm>
+            <a:off x="1117600" y="696913"/>
+            <a:ext cx="4648200" cy="3486150"/>
+          </a:xfrm>
+          <a:custGeom>
+            <a:avLst/>
+            <a:gdLst/>
+            <a:ahLst/>
+            <a:cxnLst/>
+            <a:rect l="0" t="0" r="0" b="0"/>
+            <a:pathLst>
+              <a:path w="120000" h="120000" extrusionOk="0">
+                <a:moveTo>
+                  <a:pt x="0" y="0"/>
+                </a:moveTo>
+                <a:lnTo>
+                  <a:pt x="120000" y="0"/>
+                </a:lnTo>
+                <a:lnTo>
+                  <a:pt x="120000" y="120000"/>
+                </a:lnTo>
+                <a:lnTo>
+                  <a:pt x="0" y="120000"/>
+                </a:lnTo>
+                <a:close/>
+              </a:path>
+            </a:pathLst>
+          </a:custGeom>
+        </p:spPr>
+      </p:sp>
+    </p:spTree>
+  </p:cSld>
+  <p:clrMapOvr>
+    <a:masterClrMapping/>
+  </p:clrMapOvr>
+</p:notes>
+</file>
+
+<file path=ppt/notesSlides/notesSlide11.xml><?xml version="1.0" encoding="utf-8"?>
+<p:notes xmlns:a="http://schemas.openxmlformats.org/drawingml/2006/main" xmlns:r="http://schemas.openxmlformats.org/officeDocument/2006/relationships" xmlns:p="http://schemas.openxmlformats.org/presentationml/2006/main" showMasterSp="0" showMasterPhAnim="0">
+  <p:cSld>
+    <p:spTree>
+      <p:nvGrpSpPr>
         <p:cNvPr id="1" name="Shape 147"/>
         <p:cNvGrpSpPr/>
         <p:nvPr/>
@@ -900,7 +996,7 @@
 </p:notes>
 </file>
 
-<file path=ppt/notesSlides/notesSlide11.xml><?xml version="1.0" encoding="utf-8"?>
+<file path=ppt/notesSlides/notesSlide12.xml><?xml version="1.0" encoding="utf-8"?>
 <p:notes xmlns:a="http://schemas.openxmlformats.org/drawingml/2006/main" xmlns:r="http://schemas.openxmlformats.org/officeDocument/2006/relationships" xmlns:p="http://schemas.openxmlformats.org/presentationml/2006/main" showMasterSp="0" showMasterPhAnim="0">
   <p:cSld>
     <p:spTree>
@@ -5774,6 +5870,273 @@
   <p:cSld>
     <p:spTree>
       <p:nvGrpSpPr>
+        <p:cNvPr id="1" name="Shape 134"/>
+        <p:cNvGrpSpPr/>
+        <p:nvPr/>
+      </p:nvGrpSpPr>
+      <p:grpSpPr>
+        <a:xfrm>
+          <a:off x="0" y="0"/>
+          <a:ext cx="0" cy="0"/>
+          <a:chOff x="0" y="0"/>
+          <a:chExt cx="0" cy="0"/>
+        </a:xfrm>
+      </p:grpSpPr>
+      <p:pic>
+        <p:nvPicPr>
+          <p:cNvPr id="135" name="Shape 135"/>
+          <p:cNvPicPr preferRelativeResize="0"/>
+          <p:nvPr/>
+        </p:nvPicPr>
+        <p:blipFill>
+          <a:blip r:embed="rId3"/>
+          <a:stretch>
+            <a:fillRect/>
+          </a:stretch>
+        </p:blipFill>
+        <p:spPr>
+          <a:xfrm>
+            <a:off x="7667625" y="0"/>
+            <a:ext cx="1476374" cy="1611313"/>
+          </a:xfrm>
+          <a:prstGeom prst="rect">
+            <a:avLst/>
+          </a:prstGeom>
+        </p:spPr>
+      </p:pic>
+      <p:sp>
+        <p:nvSpPr>
+          <p:cNvPr id="137" name="Shape 137"/>
+          <p:cNvSpPr/>
+          <p:nvPr/>
+        </p:nvSpPr>
+        <p:spPr>
+          <a:xfrm>
+            <a:off x="2955473" y="0"/>
+            <a:ext cx="3632751" cy="923329"/>
+          </a:xfrm>
+          <a:prstGeom prst="rect">
+            <a:avLst/>
+          </a:prstGeom>
+          <a:noFill/>
+          <a:ln>
+            <a:noFill/>
+          </a:ln>
+        </p:spPr>
+        <p:txBody>
+          <a:bodyPr lIns="91425" tIns="45700" rIns="91425" bIns="45700" anchor="t" anchorCtr="0">
+            <a:noAutofit/>
+          </a:bodyPr>
+          <a:lstStyle/>
+          <a:p>
+            <a:pPr marL="0" marR="0" lvl="0" indent="0" algn="ctr" rtl="0">
+              <a:spcBef>
+                <a:spcPts val="0"/>
+              </a:spcBef>
+              <a:spcAft>
+                <a:spcPts val="0"/>
+              </a:spcAft>
+              <a:buSzPct val="25000"/>
+              <a:buNone/>
+            </a:pPr>
+            <a:r>
+              <a:rPr lang="en-US" sz="5400" b="0" i="0" u="none" strike="noStrike" cap="none" baseline="0" dirty="0">
+                <a:solidFill>
+                  <a:schemeClr val="bg1">
+                    <a:lumMod val="75000"/>
+                  </a:schemeClr>
+                </a:solidFill>
+                <a:latin typeface="Cantarell"/>
+                <a:ea typeface="Cantarell"/>
+                <a:cs typeface="Cantarell"/>
+                <a:sym typeface="Cantarell"/>
+              </a:rPr>
+              <a:t>Realization</a:t>
+            </a:r>
+          </a:p>
+        </p:txBody>
+      </p:sp>
+      <p:sp>
+        <p:nvSpPr>
+          <p:cNvPr id="138" name="Shape 138"/>
+          <p:cNvSpPr/>
+          <p:nvPr/>
+        </p:nvSpPr>
+        <p:spPr>
+          <a:xfrm>
+            <a:off x="533400" y="453985"/>
+            <a:ext cx="7619999" cy="1908215"/>
+          </a:xfrm>
+          <a:prstGeom prst="rect">
+            <a:avLst/>
+          </a:prstGeom>
+          <a:noFill/>
+          <a:ln>
+            <a:noFill/>
+          </a:ln>
+        </p:spPr>
+        <p:txBody>
+          <a:bodyPr lIns="91425" tIns="45700" rIns="91425" bIns="45700" anchor="t" anchorCtr="0">
+            <a:noAutofit/>
+          </a:bodyPr>
+          <a:lstStyle/>
+          <a:p>
+            <a:pPr marL="0" marR="0" lvl="0" indent="0" algn="r" rtl="0">
+              <a:spcBef>
+                <a:spcPts val="0"/>
+              </a:spcBef>
+              <a:spcAft>
+                <a:spcPts val="0"/>
+              </a:spcAft>
+              <a:buSzPct val="25000"/>
+              <a:buNone/>
+            </a:pPr>
+            <a:r>
+              <a:rPr lang="en-US" sz="1800" b="1" i="0" u="none" strike="noStrike" cap="none" baseline="0" dirty="0">
+                <a:solidFill>
+                  <a:srgbClr val="DDDDDD"/>
+                </a:solidFill>
+                <a:latin typeface="Cantarell"/>
+                <a:ea typeface="Cantarell"/>
+                <a:cs typeface="Cantarell"/>
+                <a:sym typeface="Cantarell"/>
+              </a:rPr>
+              <a:t> </a:t>
+            </a:r>
+          </a:p>
+        </p:txBody>
+      </p:sp>
+      <p:sp>
+        <p:nvSpPr>
+          <p:cNvPr id="2" name="TextBox 1"/>
+          <p:cNvSpPr txBox="1"/>
+          <p:nvPr/>
+        </p:nvSpPr>
+        <p:spPr>
+          <a:xfrm>
+            <a:off x="723855" y="1007150"/>
+            <a:ext cx="5702202" cy="523220"/>
+          </a:xfrm>
+          <a:prstGeom prst="rect">
+            <a:avLst/>
+          </a:prstGeom>
+          <a:noFill/>
+        </p:spPr>
+        <p:txBody>
+          <a:bodyPr wrap="none" rtlCol="0">
+            <a:spAutoFit/>
+          </a:bodyPr>
+          <a:lstStyle/>
+          <a:p>
+            <a:r>
+              <a:rPr lang="en-US" sz="2800" dirty="0" smtClean="0">
+                <a:solidFill>
+                  <a:schemeClr val="bg1">
+                    <a:lumMod val="75000"/>
+                  </a:schemeClr>
+                </a:solidFill>
+              </a:rPr>
+              <a:t>Dark Dungeon </a:t>
+            </a:r>
+            <a:r>
+              <a:rPr lang="en-US" sz="2800" dirty="0" smtClean="0">
+                <a:solidFill>
+                  <a:schemeClr val="bg1">
+                    <a:lumMod val="75000"/>
+                  </a:schemeClr>
+                </a:solidFill>
+              </a:rPr>
+              <a:t>GUI Class </a:t>
+            </a:r>
+            <a:r>
+              <a:rPr lang="en-US" sz="2800" dirty="0" smtClean="0">
+                <a:solidFill>
+                  <a:schemeClr val="bg1">
+                    <a:lumMod val="75000"/>
+                  </a:schemeClr>
+                </a:solidFill>
+              </a:rPr>
+              <a:t>Diagram</a:t>
+            </a:r>
+            <a:endParaRPr lang="en-US" sz="2800" dirty="0">
+              <a:solidFill>
+                <a:schemeClr val="bg1">
+                  <a:lumMod val="75000"/>
+                </a:schemeClr>
+              </a:solidFill>
+            </a:endParaRPr>
+          </a:p>
+        </p:txBody>
+      </p:sp>
+      <p:pic>
+        <p:nvPicPr>
+          <p:cNvPr id="2050" name="Picture 2" descr="C:\Users\Yanko\Desktop\GUI.png"/>
+          <p:cNvPicPr>
+            <a:picLocks noChangeAspect="1" noChangeArrowheads="1"/>
+          </p:cNvPicPr>
+          <p:nvPr/>
+        </p:nvPicPr>
+        <p:blipFill>
+          <a:blip r:embed="rId4">
+            <a:extLst>
+              <a:ext uri="{28A0092B-C50C-407E-A947-70E740481C1C}">
+                <a14:useLocalDpi xmlns:a14="http://schemas.microsoft.com/office/drawing/2010/main" val="0"/>
+              </a:ext>
+            </a:extLst>
+          </a:blip>
+          <a:srcRect/>
+          <a:stretch>
+            <a:fillRect/>
+          </a:stretch>
+        </p:blipFill>
+        <p:spPr bwMode="auto">
+          <a:xfrm>
+            <a:off x="723855" y="1611313"/>
+            <a:ext cx="7681958" cy="4967092"/>
+          </a:xfrm>
+          <a:prstGeom prst="rect">
+            <a:avLst/>
+          </a:prstGeom>
+          <a:noFill/>
+          <a:extLst>
+            <a:ext uri="{909E8E84-426E-40DD-AFC4-6F175D3DCCD1}">
+              <a14:hiddenFill xmlns:a14="http://schemas.microsoft.com/office/drawing/2010/main">
+                <a:solidFill>
+                  <a:srgbClr val="FFFFFF"/>
+                </a:solidFill>
+              </a14:hiddenFill>
+            </a:ext>
+          </a:extLst>
+        </p:spPr>
+      </p:pic>
+    </p:spTree>
+    <p:extLst>
+      <p:ext uri="{BB962C8B-B14F-4D97-AF65-F5344CB8AC3E}">
+        <p14:creationId xmlns:p14="http://schemas.microsoft.com/office/powerpoint/2010/main" val="372807874"/>
+      </p:ext>
+    </p:extLst>
+  </p:cSld>
+  <p:clrMapOvr>
+    <a:masterClrMapping/>
+  </p:clrMapOvr>
+  <p:transition spd="slow">
+    <p:cut/>
+  </p:transition>
+  <p:timing>
+    <p:tnLst>
+      <p:par>
+        <p:cTn id="1" dur="indefinite" restart="never" nodeType="tmRoot"/>
+      </p:par>
+    </p:tnLst>
+  </p:timing>
+</p:sld>
+</file>
+
+<file path=ppt/slides/slide11.xml><?xml version="1.0" encoding="utf-8"?>
+<p:sld xmlns:a="http://schemas.openxmlformats.org/drawingml/2006/main" xmlns:r="http://schemas.openxmlformats.org/officeDocument/2006/relationships" xmlns:p="http://schemas.openxmlformats.org/presentationml/2006/main">
+  <p:cSld>
+    <p:spTree>
+      <p:nvGrpSpPr>
         <p:cNvPr id="1" name="Shape 142"/>
         <p:cNvGrpSpPr/>
         <p:nvPr/>
@@ -6063,7 +6426,7 @@
 </p:sld>
 </file>
 
-<file path=ppt/slides/slide11.xml><?xml version="1.0" encoding="utf-8"?>
+<file path=ppt/slides/slide12.xml><?xml version="1.0" encoding="utf-8"?>
 <p:sld xmlns:a="http://schemas.openxmlformats.org/drawingml/2006/main" xmlns:r="http://schemas.openxmlformats.org/officeDocument/2006/relationships" xmlns:p="http://schemas.openxmlformats.org/presentationml/2006/main">
   <p:cSld>
     <p:spTree>
@@ -8861,8 +9224,25 @@
                   </a:schemeClr>
                 </a:solidFill>
               </a:rPr>
-              <a:t>Interfaces count – 10</a:t>
-            </a:r>
+              <a:t>Interfaces count – </a:t>
+            </a:r>
+            <a:r>
+              <a:rPr lang="en-US" sz="2400" dirty="0" smtClean="0">
+                <a:solidFill>
+                  <a:schemeClr val="bg1">
+                    <a:lumMod val="75000"/>
+                  </a:schemeClr>
+                </a:solidFill>
+              </a:rPr>
+              <a:t>8</a:t>
+            </a:r>
+            <a:endParaRPr lang="en-US" sz="2400" dirty="0" smtClean="0">
+              <a:solidFill>
+                <a:schemeClr val="bg1">
+                  <a:lumMod val="75000"/>
+                </a:schemeClr>
+              </a:solidFill>
+            </a:endParaRPr>
           </a:p>
           <a:p>
             <a:pPr marL="342900" indent="-342900">
@@ -8877,8 +9257,25 @@
                   </a:schemeClr>
                 </a:solidFill>
               </a:rPr>
-              <a:t>Classes count – 20</a:t>
-            </a:r>
+              <a:t>Classes count – </a:t>
+            </a:r>
+            <a:r>
+              <a:rPr lang="en-US" sz="2400" dirty="0" smtClean="0">
+                <a:solidFill>
+                  <a:schemeClr val="bg1">
+                    <a:lumMod val="75000"/>
+                  </a:schemeClr>
+                </a:solidFill>
+              </a:rPr>
+              <a:t>35</a:t>
+            </a:r>
+            <a:endParaRPr lang="en-US" sz="2400" dirty="0" smtClean="0">
+              <a:solidFill>
+                <a:schemeClr val="bg1">
+                  <a:lumMod val="75000"/>
+                </a:schemeClr>
+              </a:solidFill>
+            </a:endParaRPr>
           </a:p>
           <a:p>
             <a:pPr marL="342900" indent="-342900">
@@ -8893,8 +9290,25 @@
                   </a:schemeClr>
                 </a:solidFill>
               </a:rPr>
-              <a:t>Abstract classes – 3</a:t>
-            </a:r>
+              <a:t>Abstract classes – </a:t>
+            </a:r>
+            <a:r>
+              <a:rPr lang="en-US" sz="2400" dirty="0" smtClean="0">
+                <a:solidFill>
+                  <a:schemeClr val="bg1">
+                    <a:lumMod val="75000"/>
+                  </a:schemeClr>
+                </a:solidFill>
+              </a:rPr>
+              <a:t>4</a:t>
+            </a:r>
+            <a:endParaRPr lang="en-US" sz="2400" dirty="0" smtClean="0">
+              <a:solidFill>
+                <a:schemeClr val="bg1">
+                  <a:lumMod val="75000"/>
+                </a:schemeClr>
+              </a:solidFill>
+            </a:endParaRPr>
           </a:p>
           <a:p>
             <a:pPr marL="342900" indent="-342900">
@@ -9201,9 +9615,71 @@
           </a:p>
         </p:txBody>
       </p:sp>
+      <p:sp>
+        <p:nvSpPr>
+          <p:cNvPr id="2" name="TextBox 1"/>
+          <p:cNvSpPr txBox="1"/>
+          <p:nvPr/>
+        </p:nvSpPr>
+        <p:spPr>
+          <a:xfrm>
+            <a:off x="723855" y="1007150"/>
+            <a:ext cx="5824030" cy="523220"/>
+          </a:xfrm>
+          <a:prstGeom prst="rect">
+            <a:avLst/>
+          </a:prstGeom>
+          <a:noFill/>
+        </p:spPr>
+        <p:txBody>
+          <a:bodyPr wrap="none" rtlCol="0">
+            <a:spAutoFit/>
+          </a:bodyPr>
+          <a:lstStyle/>
+          <a:p>
+            <a:r>
+              <a:rPr lang="en-US" sz="2800" dirty="0" smtClean="0">
+                <a:solidFill>
+                  <a:schemeClr val="bg1">
+                    <a:lumMod val="75000"/>
+                  </a:schemeClr>
+                </a:solidFill>
+              </a:rPr>
+              <a:t>Dark Dungeon </a:t>
+            </a:r>
+            <a:r>
+              <a:rPr lang="en-US" sz="2800" dirty="0" smtClean="0">
+                <a:solidFill>
+                  <a:schemeClr val="bg1">
+                    <a:lumMod val="75000"/>
+                  </a:schemeClr>
+                </a:solidFill>
+              </a:rPr>
+              <a:t>Data Class </a:t>
+            </a:r>
+            <a:r>
+              <a:rPr lang="en-US" sz="2800" dirty="0" smtClean="0">
+                <a:solidFill>
+                  <a:schemeClr val="bg1">
+                    <a:lumMod val="75000"/>
+                  </a:schemeClr>
+                </a:solidFill>
+              </a:rPr>
+              <a:t>Diagram</a:t>
+            </a:r>
+            <a:endParaRPr lang="en-US" sz="2800" dirty="0">
+              <a:solidFill>
+                <a:schemeClr val="bg1">
+                  <a:lumMod val="75000"/>
+                </a:schemeClr>
+              </a:solidFill>
+            </a:endParaRPr>
+          </a:p>
+        </p:txBody>
+      </p:sp>
       <p:pic>
         <p:nvPicPr>
-          <p:cNvPr id="5122" name="Picture 2" descr="C:\Users\Yanko\Desktop\ClassDiagram1.png"/>
+          <p:cNvPr id="1027" name="Picture 3" descr="C:\Users\Yanko\Desktop\ClassDiagram1.png"/>
           <p:cNvPicPr>
             <a:picLocks noChangeAspect="1" noChangeArrowheads="1"/>
           </p:cNvPicPr>
@@ -9224,8 +9700,8 @@
         </p:blipFill>
         <p:spPr bwMode="auto">
           <a:xfrm>
-            <a:off x="723855" y="1611313"/>
-            <a:ext cx="7619999" cy="4778913"/>
+            <a:off x="723854" y="1633694"/>
+            <a:ext cx="7808585" cy="4884476"/>
           </a:xfrm>
           <a:prstGeom prst="rect">
             <a:avLst/>
@@ -9242,48 +9718,6 @@
           </a:extLst>
         </p:spPr>
       </p:pic>
-      <p:sp>
-        <p:nvSpPr>
-          <p:cNvPr id="2" name="TextBox 1"/>
-          <p:cNvSpPr txBox="1"/>
-          <p:nvPr/>
-        </p:nvSpPr>
-        <p:spPr>
-          <a:xfrm>
-            <a:off x="723855" y="1007150"/>
-            <a:ext cx="4964821" cy="523220"/>
-          </a:xfrm>
-          <a:prstGeom prst="rect">
-            <a:avLst/>
-          </a:prstGeom>
-          <a:noFill/>
-        </p:spPr>
-        <p:txBody>
-          <a:bodyPr wrap="none" rtlCol="0">
-            <a:spAutoFit/>
-          </a:bodyPr>
-          <a:lstStyle/>
-          <a:p>
-            <a:r>
-              <a:rPr lang="en-US" sz="2800" dirty="0" smtClean="0">
-                <a:solidFill>
-                  <a:schemeClr val="bg1">
-                    <a:lumMod val="75000"/>
-                  </a:schemeClr>
-                </a:solidFill>
-              </a:rPr>
-              <a:t>Dark Dungeon Class Diagram</a:t>
-            </a:r>
-            <a:endParaRPr lang="en-US" sz="2800" dirty="0">
-              <a:solidFill>
-                <a:schemeClr val="bg1">
-                  <a:lumMod val="75000"/>
-                </a:schemeClr>
-              </a:solidFill>
-            </a:endParaRPr>
-          </a:p>
-        </p:txBody>
-      </p:sp>
     </p:spTree>
   </p:cSld>
   <p:clrMapOvr>

</xml_diff>